<commit_message>
Adding missing slide point
</commit_message>
<xml_diff>
--- a/talks/20160823_mad_birman.pptx
+++ b/talks/20160823_mad_birman.pptx
@@ -5,7 +5,7 @@
     <p:sldMasterId id="2147483648" r:id="rId1"/>
   </p:sldMasterIdLst>
   <p:notesMasterIdLst>
-    <p:notesMasterId r:id="rId54"/>
+    <p:notesMasterId r:id="rId55"/>
   </p:notesMasterIdLst>
   <p:sldIdLst>
     <p:sldId id="256" r:id="rId2"/>
@@ -56,10 +56,11 @@
     <p:sldId id="320" r:id="rId47"/>
     <p:sldId id="319" r:id="rId48"/>
     <p:sldId id="321" r:id="rId49"/>
-    <p:sldId id="324" r:id="rId50"/>
-    <p:sldId id="326" r:id="rId51"/>
-    <p:sldId id="325" r:id="rId52"/>
-    <p:sldId id="327" r:id="rId53"/>
+    <p:sldId id="332" r:id="rId50"/>
+    <p:sldId id="324" r:id="rId51"/>
+    <p:sldId id="326" r:id="rId52"/>
+    <p:sldId id="325" r:id="rId53"/>
+    <p:sldId id="327" r:id="rId54"/>
   </p:sldIdLst>
   <p:sldSz cx="9144000" cy="6858000" type="screen4x3"/>
   <p:notesSz cx="6858000" cy="9144000"/>
@@ -44936,7 +44937,7 @@
       </p:grpSpPr>
       <p:pic>
         <p:nvPicPr>
-          <p:cNvPr id="5" name="Picture 4" descr="avg_time_V1.pdf"/>
+          <p:cNvPr id="4" name="Picture 3" descr="avg_cc_V1.pdf"/>
           <p:cNvPicPr>
             <a:picLocks noChangeAspect="1"/>
           </p:cNvPicPr>
@@ -44956,48 +44957,48 @@
         </p:blipFill>
         <p:spPr>
           <a:xfrm>
-            <a:off x="3886200" y="914400"/>
-            <a:ext cx="7112000" cy="5321300"/>
+            <a:off x="5486400" y="0"/>
+            <a:ext cx="3666330" cy="2743200"/>
           </a:xfrm>
           <a:prstGeom prst="rect">
             <a:avLst/>
           </a:prstGeom>
         </p:spPr>
       </p:pic>
-      <p:pic>
-        <p:nvPicPr>
-          <p:cNvPr id="7" name="Picture 6" descr="avg_cc_V1.pdf"/>
-          <p:cNvPicPr>
-            <a:picLocks noChangeAspect="1"/>
-          </p:cNvPicPr>
+      <p:sp>
+        <p:nvSpPr>
+          <p:cNvPr id="5" name="TextBox 4"/>
+          <p:cNvSpPr txBox="1"/>
           <p:nvPr/>
-        </p:nvPicPr>
-        <p:blipFill>
-          <a:blip r:embed="rId3">
-            <a:extLst>
-              <a:ext uri="{28A0092B-C50C-407E-A947-70E740481C1C}">
-                <a14:useLocalDpi xmlns:a14="http://schemas.microsoft.com/office/drawing/2010/main" val="0"/>
-              </a:ext>
-            </a:extLst>
-          </a:blip>
-          <a:stretch>
-            <a:fillRect/>
-          </a:stretch>
-        </p:blipFill>
+        </p:nvSpPr>
         <p:spPr>
           <a:xfrm>
-            <a:off x="-1905000" y="762000"/>
-            <a:ext cx="7112000" cy="5321300"/>
+            <a:off x="2133600" y="4070866"/>
+            <a:ext cx="5032981" cy="369332"/>
           </a:xfrm>
           <a:prstGeom prst="rect">
             <a:avLst/>
           </a:prstGeom>
+          <a:noFill/>
         </p:spPr>
-      </p:pic>
+        <p:txBody>
+          <a:bodyPr wrap="none" rtlCol="0">
+            <a:spAutoFit/>
+          </a:bodyPr>
+          <a:lstStyle/>
+          <a:p>
+            <a:r>
+              <a:rPr lang="en-US" dirty="0" smtClean="0"/>
+              <a:t>Add slide with time series model explanation (GLM)</a:t>
+            </a:r>
+            <a:endParaRPr lang="en-US" dirty="0"/>
+          </a:p>
+        </p:txBody>
+      </p:sp>
     </p:spTree>
     <p:extLst>
       <p:ext uri="{BB962C8B-B14F-4D97-AF65-F5344CB8AC3E}">
-        <p14:creationId xmlns:p14="http://schemas.microsoft.com/office/powerpoint/2010/main" val="2426871158"/>
+        <p14:creationId xmlns:p14="http://schemas.microsoft.com/office/powerpoint/2010/main" val="1345015394"/>
       </p:ext>
     </p:extLst>
   </p:cSld>
@@ -45829,6 +45830,103 @@
       </p:grpSpPr>
       <p:pic>
         <p:nvPicPr>
+          <p:cNvPr id="5" name="Picture 4" descr="avg_time_V1.pdf"/>
+          <p:cNvPicPr>
+            <a:picLocks noChangeAspect="1"/>
+          </p:cNvPicPr>
+          <p:nvPr/>
+        </p:nvPicPr>
+        <p:blipFill>
+          <a:blip r:embed="rId2">
+            <a:extLst>
+              <a:ext uri="{28A0092B-C50C-407E-A947-70E740481C1C}">
+                <a14:useLocalDpi xmlns:a14="http://schemas.microsoft.com/office/drawing/2010/main" val="0"/>
+              </a:ext>
+            </a:extLst>
+          </a:blip>
+          <a:stretch>
+            <a:fillRect/>
+          </a:stretch>
+        </p:blipFill>
+        <p:spPr>
+          <a:xfrm>
+            <a:off x="3886200" y="914400"/>
+            <a:ext cx="7112000" cy="5321300"/>
+          </a:xfrm>
+          <a:prstGeom prst="rect">
+            <a:avLst/>
+          </a:prstGeom>
+        </p:spPr>
+      </p:pic>
+      <p:pic>
+        <p:nvPicPr>
+          <p:cNvPr id="7" name="Picture 6" descr="avg_cc_V1.pdf"/>
+          <p:cNvPicPr>
+            <a:picLocks noChangeAspect="1"/>
+          </p:cNvPicPr>
+          <p:nvPr/>
+        </p:nvPicPr>
+        <p:blipFill>
+          <a:blip r:embed="rId3">
+            <a:extLst>
+              <a:ext uri="{28A0092B-C50C-407E-A947-70E740481C1C}">
+                <a14:useLocalDpi xmlns:a14="http://schemas.microsoft.com/office/drawing/2010/main" val="0"/>
+              </a:ext>
+            </a:extLst>
+          </a:blip>
+          <a:stretch>
+            <a:fillRect/>
+          </a:stretch>
+        </p:blipFill>
+        <p:spPr>
+          <a:xfrm>
+            <a:off x="-1905000" y="762000"/>
+            <a:ext cx="7112000" cy="5321300"/>
+          </a:xfrm>
+          <a:prstGeom prst="rect">
+            <a:avLst/>
+          </a:prstGeom>
+        </p:spPr>
+      </p:pic>
+    </p:spTree>
+    <p:extLst>
+      <p:ext uri="{BB962C8B-B14F-4D97-AF65-F5344CB8AC3E}">
+        <p14:creationId xmlns:p14="http://schemas.microsoft.com/office/powerpoint/2010/main" val="2426871158"/>
+      </p:ext>
+    </p:extLst>
+  </p:cSld>
+  <p:clrMapOvr>
+    <a:masterClrMapping/>
+  </p:clrMapOvr>
+  <p:timing>
+    <p:tnLst>
+      <p:par>
+        <p:cTn id="1" dur="indefinite" restart="never" nodeType="tmRoot"/>
+      </p:par>
+    </p:tnLst>
+  </p:timing>
+</p:sld>
+</file>
+
+<file path=ppt/slides/slide51.xml><?xml version="1.0" encoding="utf-8"?>
+<p:sld xmlns:a="http://schemas.openxmlformats.org/drawingml/2006/main" xmlns:r="http://schemas.openxmlformats.org/officeDocument/2006/relationships" xmlns:p="http://schemas.openxmlformats.org/presentationml/2006/main">
+  <p:cSld>
+    <p:spTree>
+      <p:nvGrpSpPr>
+        <p:cNvPr id="1" name=""/>
+        <p:cNvGrpSpPr/>
+        <p:nvPr/>
+      </p:nvGrpSpPr>
+      <p:grpSpPr>
+        <a:xfrm>
+          <a:off x="0" y="0"/>
+          <a:ext cx="0" cy="0"/>
+          <a:chOff x="0" y="0"/>
+          <a:chExt cx="0" cy="0"/>
+        </a:xfrm>
+      </p:grpSpPr>
+      <p:pic>
+        <p:nvPicPr>
           <p:cNvPr id="4" name="Picture 3" descr="avg_cc_MT.pdf"/>
           <p:cNvPicPr>
             <a:picLocks noChangeAspect="1"/>
@@ -45907,7 +46005,7 @@
 </p:sld>
 </file>
 
-<file path=ppt/slides/slide51.xml><?xml version="1.0" encoding="utf-8"?>
+<file path=ppt/slides/slide52.xml><?xml version="1.0" encoding="utf-8"?>
 <p:sld xmlns:a="http://schemas.openxmlformats.org/drawingml/2006/main" xmlns:r="http://schemas.openxmlformats.org/officeDocument/2006/relationships" xmlns:p="http://schemas.openxmlformats.org/presentationml/2006/main">
   <p:cSld>
     <p:spTree>
@@ -45974,7 +46072,7 @@
 </p:sld>
 </file>
 
-<file path=ppt/slides/slide52.xml><?xml version="1.0" encoding="utf-8"?>
+<file path=ppt/slides/slide53.xml><?xml version="1.0" encoding="utf-8"?>
 <p:sld xmlns:a="http://schemas.openxmlformats.org/drawingml/2006/main" xmlns:r="http://schemas.openxmlformats.org/officeDocument/2006/relationships" xmlns:p="http://schemas.openxmlformats.org/presentationml/2006/main">
   <p:cSld>
     <p:spTree>

</xml_diff>